<commit_message>
Update PDF reference in main.py and add Promises in JavaScript notes
</commit_message>
<xml_diff>
--- a/presentation.pptx
+++ b/presentation.pptx
@@ -3133,7 +3133,7 @@
               <a:defRPr sz="2400"/>
             </a:pPr>
             <a:r>
-              <a:t>What is Redux? - A state management library, centralizes application state, library-agnostic.</a:t>
+              <a:t>What is Redux? - A state management library, centralizes application state, works with React but is library-agnostic.</a:t>
             </a:r>
           </a:p>
           <a:p>
@@ -3144,7 +3144,7 @@
               <a:defRPr sz="2400"/>
             </a:pPr>
             <a:r>
-              <a:t>Why Use Redux? - Manages complex state logic, single source of truth, improves predictability.</a:t>
+              <a:t>Why Use Redux? - Manages complex state logic, centralizes data, improves predictability and debugging.</a:t>
             </a:r>
           </a:p>
           <a:p>
@@ -3177,7 +3177,7 @@
               <a:defRPr sz="2400"/>
             </a:pPr>
             <a:r>
-              <a:t>Redux Flow - User interaction → Dispatch action → Reducer → New state → UI re-renders.</a:t>
+              <a:t>Redux Flow - User interaction → Dispatch action → Reducer updates state → UI re-renders.</a:t>
             </a:r>
           </a:p>
           <a:p>
@@ -3199,7 +3199,7 @@
               <a:defRPr sz="2400"/>
             </a:pPr>
             <a:r>
-              <a:t>Modern Redux (RTK) - Reduces boilerplate, createSlice, createAsyncThunk.</a:t>
+              <a:t>Modern Redux (RTK) - Simplifies Redux logic, reduces boilerplate, includes createSlice and createAsyncThunk.</a:t>
             </a:r>
           </a:p>
           <a:p>
@@ -3210,7 +3210,7 @@
               <a:defRPr sz="2400"/>
             </a:pPr>
             <a:r>
-              <a:t>When NOT to Use Redux - Small apps, no global state, Context API/useState sufficient.</a:t>
+              <a:t>When NOT to Use Redux? - Small apps, simple state, or when Context API/useState suffices.</a:t>
             </a:r>
           </a:p>
           <a:p>
@@ -3221,7 +3221,7 @@
               <a:defRPr sz="2400"/>
             </a:pPr>
             <a:r>
-              <a:t>Benefits - Centralized state, predictable transitions, easy debugging, scalable.</a:t>
+              <a:t>Benefits - Centralized state, predictable transitions, easy debugging, scalable architecture.</a:t>
             </a:r>
           </a:p>
           <a:p>
@@ -3243,7 +3243,7 @@
               <a:defRPr sz="2400"/>
             </a:pPr>
             <a:r>
-              <a:t>Best Practices - Pure reducers, normalized state shape.</a:t>
+              <a:t>Best Practices - Pure reducers, normalized state, avoid non-serializable data.</a:t>
             </a:r>
           </a:p>
         </p:txBody>
@@ -3310,7 +3310,7 @@
               <a:defRPr sz="2400"/>
             </a:pPr>
             <a:r>
-              <a:t>Avoid non-serializable values in state.</a:t>
+              <a:t>Use Redux Toolkit to simplify setup.</a:t>
             </a:r>
           </a:p>
           <a:p>
@@ -3321,7 +3321,7 @@
               <a:defRPr sz="2400"/>
             </a:pPr>
             <a:r>
-              <a:t>Simplify setup using Redux Toolkit.</a:t>
+              <a:t>Use selectors to avoid tight coupling to state shape.</a:t>
             </a:r>
           </a:p>
           <a:p>
@@ -3332,7 +3332,7 @@
               <a:defRPr sz="2400"/>
             </a:pPr>
             <a:r>
-              <a:t>Use selectors to decouple from state shape.</a:t>
+              <a:t>Comparison of Redux and Context API:</a:t>
             </a:r>
           </a:p>
           <a:p>
@@ -3343,7 +3343,7 @@
               <a:defRPr sz="2400"/>
             </a:pPr>
             <a:r>
-              <a:t>Comparison: Redux vs Context API.</a:t>
+              <a:t>- Redux: Best for large apps, complex state flows.</a:t>
             </a:r>
           </a:p>
           <a:p>
@@ -3354,7 +3354,95 @@
               <a:defRPr sz="2400"/>
             </a:pPr>
             <a:r>
-              <a:t>When to use Context API vs Redux.</a:t>
+              <a:t>- Context API: Best for small to medium apps, simple state.</a:t>
+            </a:r>
+          </a:p>
+          <a:p>
+            <a:pPr>
+              <a:spcAft>
+                <a:spcPts val="1200"/>
+              </a:spcAft>
+              <a:defRPr sz="2400"/>
+            </a:pPr>
+            <a:r>
+              <a:t>When to use Context API:</a:t>
+            </a:r>
+          </a:p>
+          <a:p>
+            <a:pPr>
+              <a:spcAft>
+                <a:spcPts val="1200"/>
+              </a:spcAft>
+              <a:defRPr sz="2400"/>
+            </a:pPr>
+            <a:r>
+              <a:t>- For static or lightweight state (e.g., theme, auth).</a:t>
+            </a:r>
+          </a:p>
+          <a:p>
+            <a:pPr>
+              <a:spcAft>
+                <a:spcPts val="1200"/>
+              </a:spcAft>
+              <a:defRPr sz="2400"/>
+            </a:pPr>
+            <a:r>
+              <a:t>- When avoiding extra libraries.</a:t>
+            </a:r>
+          </a:p>
+          <a:p>
+            <a:pPr>
+              <a:spcAft>
+                <a:spcPts val="1200"/>
+              </a:spcAft>
+              <a:defRPr sz="2400"/>
+            </a:pPr>
+            <a:r>
+              <a:t>- When state changes infrequently.</a:t>
+            </a:r>
+          </a:p>
+          <a:p>
+            <a:pPr>
+              <a:spcAft>
+                <a:spcPts val="1200"/>
+              </a:spcAft>
+              <a:defRPr sz="2400"/>
+            </a:pPr>
+            <a:r>
+              <a:t>When to use Redux:</a:t>
+            </a:r>
+          </a:p>
+          <a:p>
+            <a:pPr>
+              <a:spcAft>
+                <a:spcPts val="1200"/>
+              </a:spcAft>
+              <a:defRPr sz="2400"/>
+            </a:pPr>
+            <a:r>
+              <a:t>- For large, shared, or complex app state.</a:t>
+            </a:r>
+          </a:p>
+          <a:p>
+            <a:pPr>
+              <a:spcAft>
+                <a:spcPts val="1200"/>
+              </a:spcAft>
+              <a:defRPr sz="2400"/>
+            </a:pPr>
+            <a:r>
+              <a:t>- When middleware, async handling, or devtools are needed.</a:t>
+            </a:r>
+          </a:p>
+          <a:p>
+            <a:pPr>
+              <a:spcAft>
+                <a:spcPts val="1200"/>
+              </a:spcAft>
+              <a:defRPr sz="2400"/>
+            </a:pPr>
+            <a:r>
+              <a:t>- For predictable and testable state transitions.</a:t>
             </a:r>
           </a:p>
         </p:txBody>

</xml_diff>